<commit_message>
uploaded Ensemble Method and Bayesian View of Deep Learning
</commit_message>
<xml_diff>
--- a/DeepQNetwork/KAIM_DQN.pptx
+++ b/DeepQNetwork/KAIM_DQN.pptx
@@ -5,10 +5,10 @@
     <p:sldMasterId id="2147483660" r:id="rId1"/>
   </p:sldMasterIdLst>
   <p:notesMasterIdLst>
-    <p:notesMasterId r:id="rId14"/>
+    <p:notesMasterId r:id="rId15"/>
   </p:notesMasterIdLst>
   <p:handoutMasterIdLst>
-    <p:handoutMasterId r:id="rId15"/>
+    <p:handoutMasterId r:id="rId16"/>
   </p:handoutMasterIdLst>
   <p:sldIdLst>
     <p:sldId id="256" r:id="rId2"/>
@@ -19,10 +19,11 @@
     <p:sldId id="268" r:id="rId7"/>
     <p:sldId id="266" r:id="rId8"/>
     <p:sldId id="265" r:id="rId9"/>
-    <p:sldId id="267" r:id="rId10"/>
-    <p:sldId id="257" r:id="rId11"/>
-    <p:sldId id="260" r:id="rId12"/>
-    <p:sldId id="259" r:id="rId13"/>
+    <p:sldId id="269" r:id="rId10"/>
+    <p:sldId id="267" r:id="rId11"/>
+    <p:sldId id="257" r:id="rId12"/>
+    <p:sldId id="260" r:id="rId13"/>
+    <p:sldId id="259" r:id="rId14"/>
   </p:sldIdLst>
   <p:sldSz cx="9144000" cy="6858000" type="screen4x3"/>
   <p:notesSz cx="6858000" cy="9144000"/>
@@ -214,7 +215,7 @@
           <a:p>
             <a:fld id="{461AA7AA-1EEA-4305-ADD7-9B6BCFC95A85}" type="datetimeFigureOut">
               <a:rPr lang="en-IN" smtClean="0"/>
-              <a:t>09/02/18</a:t>
+              <a:t>03/11/18</a:t>
             </a:fld>
             <a:endParaRPr lang="en-IN"/>
           </a:p>
@@ -379,7 +380,7 @@
           <a:p>
             <a:fld id="{A722EFDE-BAE1-493A-B594-BF1A31846238}" type="datetimeFigureOut">
               <a:rPr lang="en-IN" smtClean="0"/>
-              <a:t>09/02/18</a:t>
+              <a:t>03/11/18</a:t>
             </a:fld>
             <a:endParaRPr lang="en-IN"/>
           </a:p>
@@ -818,7 +819,7 @@
           <a:p>
             <a:fld id="{F6D289C5-CBB2-406C-9E89-14FC18E60293}" type="datetime1">
               <a:rPr lang="en-US" smtClean="0"/>
-              <a:t>2/9/18</a:t>
+              <a:t>11/3/18</a:t>
             </a:fld>
             <a:endParaRPr lang="en-US" dirty="0"/>
           </a:p>
@@ -1195,7 +1196,7 @@
           <a:p>
             <a:fld id="{84F85344-50F8-4BA2-A256-B05C22341B47}" type="datetime1">
               <a:rPr lang="en-US" smtClean="0"/>
-              <a:t>2/9/18</a:t>
+              <a:t>11/3/18</a:t>
             </a:fld>
             <a:endParaRPr lang="en-US" dirty="0"/>
           </a:p>
@@ -1379,7 +1380,7 @@
           <a:p>
             <a:fld id="{9020D7C4-15FC-4D76-BA27-4F6FBDE6CFF1}" type="datetime1">
               <a:rPr lang="en-US" smtClean="0"/>
-              <a:t>2/9/18</a:t>
+              <a:t>11/3/18</a:t>
             </a:fld>
             <a:endParaRPr lang="en-US" dirty="0"/>
           </a:p>
@@ -1562,7 +1563,7 @@
           <a:p>
             <a:fld id="{E3BFF71F-2DB8-4043-ABBD-74B28BED1D2C}" type="datetime1">
               <a:rPr lang="en-US" smtClean="0"/>
-              <a:t>2/9/18</a:t>
+              <a:t>11/3/18</a:t>
             </a:fld>
             <a:endParaRPr lang="en-US" dirty="0"/>
           </a:p>
@@ -1845,7 +1846,7 @@
           <a:p>
             <a:fld id="{3DA1A4B3-CF9C-402D-A241-1CE0F6CCFF5F}" type="datetime1">
               <a:rPr lang="en-US" smtClean="0"/>
-              <a:t>2/9/18</a:t>
+              <a:t>11/3/18</a:t>
             </a:fld>
             <a:endParaRPr lang="en-US" dirty="0"/>
           </a:p>
@@ -2300,7 +2301,7 @@
           <a:p>
             <a:fld id="{43CE70B8-64A9-4C10-86CA-436A23DF1D37}" type="datetime1">
               <a:rPr lang="en-US" smtClean="0"/>
-              <a:t>2/9/18</a:t>
+              <a:t>11/3/18</a:t>
             </a:fld>
             <a:endParaRPr lang="en-US" dirty="0"/>
           </a:p>
@@ -2781,7 +2782,7 @@
           <a:p>
             <a:fld id="{63F2CB91-81D1-42C2-908D-A962F407C73A}" type="datetime1">
               <a:rPr lang="en-US" smtClean="0"/>
-              <a:t>2/9/18</a:t>
+              <a:t>11/3/18</a:t>
             </a:fld>
             <a:endParaRPr lang="en-US" dirty="0"/>
           </a:p>
@@ -2903,7 +2904,7 @@
           <a:p>
             <a:fld id="{80C906A9-C442-4935-B642-0C5542EC6D8B}" type="datetime1">
               <a:rPr lang="en-US" smtClean="0"/>
-              <a:t>2/9/18</a:t>
+              <a:t>11/3/18</a:t>
             </a:fld>
             <a:endParaRPr lang="en-US" dirty="0"/>
           </a:p>
@@ -3002,7 +3003,7 @@
           <a:p>
             <a:fld id="{8CE75276-F13B-4D4E-B7B0-226E57511BF6}" type="datetime1">
               <a:rPr lang="en-US" smtClean="0"/>
-              <a:t>2/9/18</a:t>
+              <a:t>11/3/18</a:t>
             </a:fld>
             <a:endParaRPr lang="en-US" dirty="0"/>
           </a:p>
@@ -3354,7 +3355,7 @@
           <a:p>
             <a:fld id="{869F981A-2426-49BE-BD97-120C52E26D63}" type="datetime1">
               <a:rPr lang="en-US" smtClean="0"/>
-              <a:t>2/9/18</a:t>
+              <a:t>11/3/18</a:t>
             </a:fld>
             <a:endParaRPr lang="en-US" dirty="0"/>
           </a:p>
@@ -3787,7 +3788,7 @@
           <a:p>
             <a:fld id="{5F8B5A8E-BD2C-4293-91F3-8053F6FF91C9}" type="datetime1">
               <a:rPr lang="en-US" smtClean="0"/>
-              <a:t>2/9/18</a:t>
+              <a:t>11/3/18</a:t>
             </a:fld>
             <a:endParaRPr lang="en-US" dirty="0"/>
           </a:p>
@@ -4107,7 +4108,7 @@
           <a:p>
             <a:fld id="{FDD387AA-20B5-477F-988D-CF0B0882B5CB}" type="datetime1">
               <a:rPr lang="en-US" smtClean="0"/>
-              <a:t>2/9/18</a:t>
+              <a:t>11/3/18</a:t>
             </a:fld>
             <a:endParaRPr lang="en-US" dirty="0"/>
           </a:p>
@@ -4858,7 +4859,13 @@
       </p:grpSpPr>
       <p:sp>
         <p:nvSpPr>
-          <p:cNvPr id="2" name="Title 1"/>
+          <p:cNvPr id="2" name="タイトル 1">
+            <a:extLst>
+              <a:ext uri="{FF2B5EF4-FFF2-40B4-BE49-F238E27FC236}">
+                <a16:creationId xmlns:a16="http://schemas.microsoft.com/office/drawing/2014/main" id="{8F0F29E7-A4B0-2B47-B60C-156FC2872613}"/>
+              </a:ext>
+            </a:extLst>
+          </p:cNvPr>
           <p:cNvSpPr>
             <a:spLocks noGrp="1"/>
           </p:cNvSpPr>
@@ -4872,16 +4879,30 @@
           <a:lstStyle/>
           <a:p>
             <a:r>
-              <a:rPr lang="ja-JP" altLang="en-US" dirty="0"/>
-              <a:t>参考になるプログラム</a:t>
-            </a:r>
-            <a:endParaRPr lang="en-IN" dirty="0"/>
-          </a:p>
-        </p:txBody>
-      </p:sp>
-      <p:sp>
-        <p:nvSpPr>
-          <p:cNvPr id="3" name="Content Placeholder 2"/>
+              <a:rPr kumimoji="1" lang="en-US" altLang="ja-JP" dirty="0"/>
+              <a:t>Experience Replay</a:t>
+            </a:r>
+            <a:r>
+              <a:rPr kumimoji="1" lang="ja-JP" altLang="en-US" dirty="0"/>
+              <a:t>とは</a:t>
+            </a:r>
+            <a:r>
+              <a:rPr kumimoji="1" lang="en-US" altLang="ja-JP" dirty="0"/>
+              <a:t>?</a:t>
+            </a:r>
+            <a:endParaRPr kumimoji="1" lang="ja-JP" altLang="en-US" dirty="0"/>
+          </a:p>
+        </p:txBody>
+      </p:sp>
+      <p:sp>
+        <p:nvSpPr>
+          <p:cNvPr id="3" name="コンテンツ プレースホルダー 2">
+            <a:extLst>
+              <a:ext uri="{FF2B5EF4-FFF2-40B4-BE49-F238E27FC236}">
+                <a16:creationId xmlns:a16="http://schemas.microsoft.com/office/drawing/2014/main" id="{4A78FCEE-52BD-084B-B54B-906447B81F9F}"/>
+              </a:ext>
+            </a:extLst>
+          </p:cNvPr>
           <p:cNvSpPr>
             <a:spLocks noGrp="1"/>
           </p:cNvSpPr>
@@ -4894,57 +4915,52 @@
           <a:bodyPr/>
           <a:lstStyle/>
           <a:p>
-            <a:endParaRPr lang="en-IN" dirty="0"/>
-          </a:p>
-          <a:p>
-            <a:r>
-              <a:rPr lang="en-IN" altLang="ja-JP" dirty="0">
-                <a:hlinkClick r:id="rId2"/>
-              </a:rPr>
-              <a:t>https://github.com/rlcode/reinforcement-learning</a:t>
-            </a:r>
-            <a:r>
-              <a:rPr lang="ja-JP" altLang="en-US" dirty="0"/>
-              <a:t>（オススメ</a:t>
-            </a:r>
-            <a:r>
-              <a:rPr lang="en-US" altLang="ja-JP" dirty="0"/>
-              <a:t>!</a:t>
-            </a:r>
-            <a:r>
-              <a:rPr lang="ja-JP" altLang="en-US" dirty="0"/>
-              <a:t>）</a:t>
-            </a:r>
-            <a:endParaRPr lang="en-IN" dirty="0">
-              <a:hlinkClick r:id="rId3"/>
-            </a:endParaRPr>
-          </a:p>
-          <a:p>
-            <a:r>
-              <a:rPr lang="en-IN" dirty="0">
-                <a:hlinkClick r:id="rId3"/>
-              </a:rPr>
-              <a:t>https://github.com/yukiB/keras-dqn-test</a:t>
-            </a:r>
-            <a:endParaRPr lang="en-IN" dirty="0"/>
-          </a:p>
-          <a:p>
-            <a:r>
-              <a:rPr lang="en-IN" dirty="0">
-                <a:hlinkClick r:id="rId4"/>
-              </a:rPr>
-              <a:t>https://github.com/icoxfog417/chainer_pong</a:t>
-            </a:r>
-            <a:endParaRPr lang="en-IN" dirty="0"/>
-          </a:p>
-          <a:p>
-            <a:endParaRPr lang="en-IN" dirty="0"/>
-          </a:p>
-        </p:txBody>
-      </p:sp>
-      <p:sp>
-        <p:nvSpPr>
-          <p:cNvPr id="4" name="Footer Placeholder 3"/>
+            <a:r>
+              <a:rPr kumimoji="1" lang="ja-JP" altLang="en-US" dirty="0"/>
+              <a:t>エージェントが経験した全ての「状態、行動、報酬、行動を取った後の次の状態」を保存する</a:t>
+            </a:r>
+            <a:endParaRPr kumimoji="1" lang="en-US" altLang="ja-JP" dirty="0"/>
+          </a:p>
+          <a:p>
+            <a:r>
+              <a:rPr kumimoji="1" lang="ja-JP" altLang="en-US" dirty="0"/>
+              <a:t>保存したデータの中からランダムにデータを取り出し、学習させる</a:t>
+            </a:r>
+            <a:endParaRPr kumimoji="1" lang="en-US" altLang="ja-JP" dirty="0"/>
+          </a:p>
+          <a:p>
+            <a:r>
+              <a:rPr kumimoji="1" lang="ja-JP" altLang="en-US" dirty="0"/>
+              <a:t>以上の方法により学習が安定する</a:t>
+            </a:r>
+            <a:endParaRPr kumimoji="1" lang="en-US" altLang="ja-JP" dirty="0"/>
+          </a:p>
+          <a:p>
+            <a:r>
+              <a:rPr kumimoji="1" lang="ja-JP" altLang="en-US" dirty="0"/>
+              <a:t>マシンの制約などにより、メモリ上にデータが乗り切らない場合は保存する数を決めて、溢れた場合は</a:t>
+            </a:r>
+            <a:r>
+              <a:rPr kumimoji="1" lang="ja-JP" altLang="en-US"/>
+              <a:t>ランダムに古いデータ</a:t>
+            </a:r>
+            <a:r>
+              <a:rPr kumimoji="1" lang="ja-JP" altLang="en-US" dirty="0"/>
+              <a:t>を削除する</a:t>
+            </a:r>
+            <a:endParaRPr kumimoji="1" lang="en-US" altLang="ja-JP" dirty="0"/>
+          </a:p>
+        </p:txBody>
+      </p:sp>
+      <p:sp>
+        <p:nvSpPr>
+          <p:cNvPr id="4" name="フッター プレースホルダー 3">
+            <a:extLst>
+              <a:ext uri="{FF2B5EF4-FFF2-40B4-BE49-F238E27FC236}">
+                <a16:creationId xmlns:a16="http://schemas.microsoft.com/office/drawing/2014/main" id="{C65D3F75-F4B2-E441-ADF8-524D6194485D}"/>
+              </a:ext>
+            </a:extLst>
+          </p:cNvPr>
           <p:cNvSpPr>
             <a:spLocks noGrp="1"/>
           </p:cNvSpPr>
@@ -4968,7 +4984,7 @@
     </p:spTree>
     <p:extLst>
       <p:ext uri="{BB962C8B-B14F-4D97-AF65-F5344CB8AC3E}">
-        <p14:creationId xmlns:p14="http://schemas.microsoft.com/office/powerpoint/2010/main" val="4061633785"/>
+        <p14:creationId xmlns:p14="http://schemas.microsoft.com/office/powerpoint/2010/main" val="2785021231"/>
       </p:ext>
     </p:extLst>
   </p:cSld>
@@ -5012,6 +5028,145 @@
           <a:p>
             <a:r>
               <a:rPr lang="ja-JP" altLang="en-US" dirty="0"/>
+              <a:t>参考になるプログラム</a:t>
+            </a:r>
+            <a:endParaRPr lang="en-IN" dirty="0"/>
+          </a:p>
+        </p:txBody>
+      </p:sp>
+      <p:sp>
+        <p:nvSpPr>
+          <p:cNvPr id="3" name="Content Placeholder 2"/>
+          <p:cNvSpPr>
+            <a:spLocks noGrp="1"/>
+          </p:cNvSpPr>
+          <p:nvPr>
+            <p:ph idx="1"/>
+          </p:nvPr>
+        </p:nvSpPr>
+        <p:spPr/>
+        <p:txBody>
+          <a:bodyPr/>
+          <a:lstStyle/>
+          <a:p>
+            <a:endParaRPr lang="en-IN" dirty="0"/>
+          </a:p>
+          <a:p>
+            <a:r>
+              <a:rPr lang="en-IN" altLang="ja-JP" dirty="0">
+                <a:hlinkClick r:id="rId2"/>
+              </a:rPr>
+              <a:t>https://github.com/rlcode/reinforcement-learning</a:t>
+            </a:r>
+            <a:r>
+              <a:rPr lang="ja-JP" altLang="en-US" dirty="0"/>
+              <a:t>（オススメ</a:t>
+            </a:r>
+            <a:r>
+              <a:rPr lang="en-US" altLang="ja-JP" dirty="0"/>
+              <a:t>!</a:t>
+            </a:r>
+            <a:r>
+              <a:rPr lang="ja-JP" altLang="en-US" dirty="0"/>
+              <a:t>）</a:t>
+            </a:r>
+            <a:endParaRPr lang="en-IN" dirty="0">
+              <a:hlinkClick r:id="rId3"/>
+            </a:endParaRPr>
+          </a:p>
+          <a:p>
+            <a:r>
+              <a:rPr lang="en-IN" dirty="0">
+                <a:hlinkClick r:id="rId3"/>
+              </a:rPr>
+              <a:t>https://github.com/yukiB/keras-dqn-test</a:t>
+            </a:r>
+            <a:endParaRPr lang="en-IN" dirty="0"/>
+          </a:p>
+          <a:p>
+            <a:r>
+              <a:rPr lang="en-IN" dirty="0">
+                <a:hlinkClick r:id="rId4"/>
+              </a:rPr>
+              <a:t>https://github.com/icoxfog417/chainer_pong</a:t>
+            </a:r>
+            <a:endParaRPr lang="en-IN" dirty="0"/>
+          </a:p>
+          <a:p>
+            <a:endParaRPr lang="en-IN" dirty="0"/>
+          </a:p>
+        </p:txBody>
+      </p:sp>
+      <p:sp>
+        <p:nvSpPr>
+          <p:cNvPr id="4" name="Footer Placeholder 3"/>
+          <p:cNvSpPr>
+            <a:spLocks noGrp="1"/>
+          </p:cNvSpPr>
+          <p:nvPr>
+            <p:ph type="ftr" sz="quarter" idx="11"/>
+          </p:nvPr>
+        </p:nvSpPr>
+        <p:spPr/>
+        <p:txBody>
+          <a:bodyPr/>
+          <a:lstStyle/>
+          <a:p>
+            <a:r>
+              <a:rPr lang="en-US"/>
+              <a:t>KAIM</a:t>
+            </a:r>
+            <a:endParaRPr lang="en-US" dirty="0"/>
+          </a:p>
+        </p:txBody>
+      </p:sp>
+    </p:spTree>
+    <p:extLst>
+      <p:ext uri="{BB962C8B-B14F-4D97-AF65-F5344CB8AC3E}">
+        <p14:creationId xmlns:p14="http://schemas.microsoft.com/office/powerpoint/2010/main" val="4061633785"/>
+      </p:ext>
+    </p:extLst>
+  </p:cSld>
+  <p:clrMapOvr>
+    <a:masterClrMapping/>
+  </p:clrMapOvr>
+</p:sld>
+</file>
+
+<file path=ppt/slides/slide12.xml><?xml version="1.0" encoding="utf-8"?>
+<p:sld xmlns:a="http://schemas.openxmlformats.org/drawingml/2006/main" xmlns:r="http://schemas.openxmlformats.org/officeDocument/2006/relationships" xmlns:p="http://schemas.openxmlformats.org/presentationml/2006/main">
+  <p:cSld>
+    <p:spTree>
+      <p:nvGrpSpPr>
+        <p:cNvPr id="1" name=""/>
+        <p:cNvGrpSpPr/>
+        <p:nvPr/>
+      </p:nvGrpSpPr>
+      <p:grpSpPr>
+        <a:xfrm>
+          <a:off x="0" y="0"/>
+          <a:ext cx="0" cy="0"/>
+          <a:chOff x="0" y="0"/>
+          <a:chExt cx="0" cy="0"/>
+        </a:xfrm>
+      </p:grpSpPr>
+      <p:sp>
+        <p:nvSpPr>
+          <p:cNvPr id="2" name="Title 1"/>
+          <p:cNvSpPr>
+            <a:spLocks noGrp="1"/>
+          </p:cNvSpPr>
+          <p:nvPr>
+            <p:ph type="title"/>
+          </p:nvPr>
+        </p:nvSpPr>
+        <p:spPr/>
+        <p:txBody>
+          <a:bodyPr/>
+          <a:lstStyle/>
+          <a:p>
+            <a:r>
+              <a:rPr lang="ja-JP" altLang="en-US" dirty="0"/>
               <a:t>参考文献</a:t>
             </a:r>
             <a:endParaRPr lang="en-IN" dirty="0"/>
@@ -5147,7 +5302,7 @@
 </p:sld>
 </file>
 
-<file path=ppt/slides/slide12.xml><?xml version="1.0" encoding="utf-8"?>
+<file path=ppt/slides/slide13.xml><?xml version="1.0" encoding="utf-8"?>
 <p:sld xmlns:a="http://schemas.openxmlformats.org/drawingml/2006/main" xmlns:r="http://schemas.openxmlformats.org/officeDocument/2006/relationships" xmlns:p="http://schemas.openxmlformats.org/presentationml/2006/main">
   <p:cSld>
     <p:spTree>
@@ -6244,7 +6399,15 @@
           <a:p>
             <a:r>
               <a:rPr kumimoji="1" lang="ja-JP" altLang="en-US" dirty="0"/>
-              <a:t>ある時点から一つ先の行動価値の最大値と、ある時点から一つ前に観測された行動価値の差分に重みをつけて、ある時点から一つ前のニューラルネットなどからの推定価値</a:t>
+              <a:t>ある時点から一つ先の行動価値の最大値と、ある時点から一つ前に観測された行動価値の差分に重みをつけて、ある時点</a:t>
+            </a:r>
+            <a:r>
+              <a:rPr kumimoji="1" lang="ja-JP" altLang="en-US"/>
+              <a:t>から一つ前時点のニューラルネットから</a:t>
+            </a:r>
+            <a:r>
+              <a:rPr kumimoji="1" lang="ja-JP" altLang="en-US" dirty="0"/>
+              <a:t>の推定価値</a:t>
             </a:r>
             <a:r>
               <a:rPr kumimoji="1" lang="en-US" altLang="ja-JP" dirty="0"/>
@@ -6259,9 +6422,12 @@
               <a:t>)</a:t>
             </a:r>
             <a:r>
-              <a:rPr kumimoji="1" lang="ja-JP" altLang="en-US" dirty="0"/>
-              <a:t>に足しこむ手法</a:t>
-            </a:r>
+              <a:rPr kumimoji="1" lang="ja-JP" altLang="en-US"/>
+              <a:t>に足しこみ、学習させる手法</a:t>
+            </a:r>
+            <a:endParaRPr kumimoji="1" lang="en-US" altLang="ja-JP" dirty="0"/>
+          </a:p>
+          <a:p>
             <a:endParaRPr kumimoji="1" lang="en-US" altLang="ja-JP" dirty="0"/>
           </a:p>
           <a:p>
@@ -6950,6 +7116,36 @@
           </a:p>
         </p:txBody>
       </p:sp>
+      <p:pic>
+        <p:nvPicPr>
+          <p:cNvPr id="10" name="図 9">
+            <a:extLst>
+              <a:ext uri="{FF2B5EF4-FFF2-40B4-BE49-F238E27FC236}">
+                <a16:creationId xmlns:a16="http://schemas.microsoft.com/office/drawing/2014/main" id="{3E2B0105-65B7-D84F-BB17-18614E9095F7}"/>
+              </a:ext>
+            </a:extLst>
+          </p:cNvPr>
+          <p:cNvPicPr>
+            <a:picLocks noChangeAspect="1"/>
+          </p:cNvPicPr>
+          <p:nvPr/>
+        </p:nvPicPr>
+        <p:blipFill>
+          <a:blip r:embed="rId2"/>
+          <a:stretch>
+            <a:fillRect/>
+          </a:stretch>
+        </p:blipFill>
+        <p:spPr>
+          <a:xfrm>
+            <a:off x="1614857" y="3056547"/>
+            <a:ext cx="5904090" cy="546442"/>
+          </a:xfrm>
+          <a:prstGeom prst="rect">
+            <a:avLst/>
+          </a:prstGeom>
+        </p:spPr>
+      </p:pic>
     </p:spTree>
     <p:extLst>
       <p:ext uri="{BB962C8B-B14F-4D97-AF65-F5344CB8AC3E}">
@@ -6985,7 +7181,7 @@
           <p:cNvPr id="2" name="タイトル 1">
             <a:extLst>
               <a:ext uri="{FF2B5EF4-FFF2-40B4-BE49-F238E27FC236}">
-                <a16:creationId xmlns:a16="http://schemas.microsoft.com/office/drawing/2014/main" id="{8F0F29E7-A4B0-2B47-B60C-156FC2872613}"/>
+                <a16:creationId xmlns:a16="http://schemas.microsoft.com/office/drawing/2014/main" id="{3E7595D1-1310-C747-9A68-F9D1C68C1AB7}"/>
               </a:ext>
             </a:extLst>
           </p:cNvPr>
@@ -7002,18 +7198,9 @@
           <a:lstStyle/>
           <a:p>
             <a:r>
-              <a:rPr kumimoji="1" lang="en-US" altLang="ja-JP" dirty="0"/>
-              <a:t>Experience Replay</a:t>
-            </a:r>
-            <a:r>
-              <a:rPr kumimoji="1" lang="ja-JP" altLang="en-US" dirty="0"/>
-              <a:t>とは</a:t>
-            </a:r>
-            <a:r>
-              <a:rPr kumimoji="1" lang="en-US" altLang="ja-JP" dirty="0"/>
-              <a:t>?</a:t>
-            </a:r>
-            <a:endParaRPr kumimoji="1" lang="ja-JP" altLang="en-US" dirty="0"/>
+              <a:rPr kumimoji="1" lang="ja-JP" altLang="en-US"/>
+              <a:t>追加するスライド</a:t>
+            </a:r>
           </a:p>
         </p:txBody>
       </p:sp>
@@ -7022,7 +7209,7 @@
           <p:cNvPr id="3" name="コンテンツ プレースホルダー 2">
             <a:extLst>
               <a:ext uri="{FF2B5EF4-FFF2-40B4-BE49-F238E27FC236}">
-                <a16:creationId xmlns:a16="http://schemas.microsoft.com/office/drawing/2014/main" id="{4A78FCEE-52BD-084B-B54B-906447B81F9F}"/>
+                <a16:creationId xmlns:a16="http://schemas.microsoft.com/office/drawing/2014/main" id="{EF8F6AA1-58D1-2C4B-BB70-222FF5B77FA3}"/>
               </a:ext>
             </a:extLst>
           </p:cNvPr>
@@ -7039,39 +7226,46 @@
           <a:lstStyle/>
           <a:p>
             <a:r>
-              <a:rPr kumimoji="1" lang="ja-JP" altLang="en-US" dirty="0"/>
-              <a:t>エージェントが経験した全ての「状態、行動、報酬、行動を取った後の次の状態」を保存する</a:t>
+              <a:rPr lang="ja-JP" altLang="en-US"/>
+              <a:t>イプシロングリーディー</a:t>
+            </a:r>
+            <a:endParaRPr lang="en-US" altLang="ja-JP" dirty="0"/>
+          </a:p>
+          <a:p>
+            <a:r>
+              <a:rPr kumimoji="1" lang="en-US" altLang="ja-JP" dirty="0"/>
+              <a:t>Deep</a:t>
+            </a:r>
+            <a:r>
+              <a:rPr kumimoji="1" lang="ja-JP" altLang="en-US"/>
+              <a:t>の部分の説明</a:t>
             </a:r>
             <a:endParaRPr kumimoji="1" lang="en-US" altLang="ja-JP" dirty="0"/>
           </a:p>
           <a:p>
             <a:r>
-              <a:rPr kumimoji="1" lang="ja-JP" altLang="en-US" dirty="0"/>
-              <a:t>保存したデータの中からランダムにデータを取り出し、学習させる</a:t>
+              <a:rPr lang="ja-JP" altLang="en-US"/>
+              <a:t>フーバー損失（</a:t>
+            </a:r>
+            <a:r>
+              <a:rPr kumimoji="1" lang="ja-JP" altLang="en-US"/>
+              <a:t>ロバストにできる）</a:t>
             </a:r>
             <a:endParaRPr kumimoji="1" lang="en-US" altLang="ja-JP" dirty="0"/>
           </a:p>
           <a:p>
             <a:r>
-              <a:rPr kumimoji="1" lang="ja-JP" altLang="en-US" dirty="0"/>
-              <a:t>以上の方法により学習が安定する</a:t>
-            </a:r>
-            <a:endParaRPr kumimoji="1" lang="en-US" altLang="ja-JP" dirty="0"/>
-          </a:p>
-          <a:p>
-            <a:r>
-              <a:rPr kumimoji="1" lang="ja-JP" altLang="en-US" dirty="0"/>
-              <a:t>マシンの制約などにより、メモリ上にデータが乗り切らない場合は保存する数を決めて、溢れた場合は</a:t>
-            </a:r>
-            <a:r>
-              <a:rPr kumimoji="1" lang="ja-JP" altLang="en-US"/>
-              <a:t>ランダムに古いデータ</a:t>
-            </a:r>
-            <a:r>
-              <a:rPr kumimoji="1" lang="ja-JP" altLang="en-US" dirty="0"/>
-              <a:t>を削除する</a:t>
-            </a:r>
-            <a:endParaRPr kumimoji="1" lang="en-US" altLang="ja-JP" dirty="0"/>
+              <a:rPr lang="en-US" altLang="ja-JP" dirty="0"/>
+              <a:t>QT </a:t>
+            </a:r>
+            <a:r>
+              <a:rPr lang="ja-JP" altLang="en-US"/>
+              <a:t>型の損失</a:t>
+            </a:r>
+            <a:endParaRPr kumimoji="1" lang="ja-JP" altLang="en-US"/>
+          </a:p>
+          <a:p>
+            <a:endParaRPr kumimoji="1" lang="ja-JP" altLang="en-US"/>
           </a:p>
         </p:txBody>
       </p:sp>
@@ -7080,7 +7274,7 @@
           <p:cNvPr id="4" name="フッター プレースホルダー 3">
             <a:extLst>
               <a:ext uri="{FF2B5EF4-FFF2-40B4-BE49-F238E27FC236}">
-                <a16:creationId xmlns:a16="http://schemas.microsoft.com/office/drawing/2014/main" id="{C65D3F75-F4B2-E441-ADF8-524D6194485D}"/>
+                <a16:creationId xmlns:a16="http://schemas.microsoft.com/office/drawing/2014/main" id="{8408E53F-1224-164C-BA5C-69124DB11F9E}"/>
               </a:ext>
             </a:extLst>
           </p:cNvPr>
@@ -7107,7 +7301,7 @@
     </p:spTree>
     <p:extLst>
       <p:ext uri="{BB962C8B-B14F-4D97-AF65-F5344CB8AC3E}">
-        <p14:creationId xmlns:p14="http://schemas.microsoft.com/office/powerpoint/2010/main" val="2785021231"/>
+        <p14:creationId xmlns:p14="http://schemas.microsoft.com/office/powerpoint/2010/main" val="2293233096"/>
       </p:ext>
     </p:extLst>
   </p:cSld>

</xml_diff>